<commit_message>
adding references to slides
</commit_message>
<xml_diff>
--- a/projects/group2/mid_slide.pptx
+++ b/projects/group2/mid_slide.pptx
@@ -112,6 +112,11 @@
       </a:defRPr>
     </a:lvl9pPr>
   </p:defaultTextStyle>
+  <p:extLst>
+    <p:ext uri="{EFAFB233-063F-42B5-8137-9DF3F51BA10A}">
+      <p15:sldGuideLst xmlns:p15="http://schemas.microsoft.com/office/powerpoint/2012/main"/>
+    </p:ext>
+  </p:extLst>
 </p:presentation>
 </file>
 
@@ -264,7 +269,7 @@
           <a:p>
             <a:fld id="{BA759A12-2595-43BB-889B-763B23529FAF}" type="datetimeFigureOut">
               <a:rPr lang="en-CA" smtClean="0"/>
-              <a:t>2023-03-10</a:t>
+              <a:t>2023-03-11</a:t>
             </a:fld>
             <a:endParaRPr lang="en-CA"/>
           </a:p>
@@ -464,7 +469,7 @@
           <a:p>
             <a:fld id="{BA759A12-2595-43BB-889B-763B23529FAF}" type="datetimeFigureOut">
               <a:rPr lang="en-CA" smtClean="0"/>
-              <a:t>2023-03-10</a:t>
+              <a:t>2023-03-11</a:t>
             </a:fld>
             <a:endParaRPr lang="en-CA"/>
           </a:p>
@@ -674,7 +679,7 @@
           <a:p>
             <a:fld id="{BA759A12-2595-43BB-889B-763B23529FAF}" type="datetimeFigureOut">
               <a:rPr lang="en-CA" smtClean="0"/>
-              <a:t>2023-03-10</a:t>
+              <a:t>2023-03-11</a:t>
             </a:fld>
             <a:endParaRPr lang="en-CA"/>
           </a:p>
@@ -874,7 +879,7 @@
           <a:p>
             <a:fld id="{BA759A12-2595-43BB-889B-763B23529FAF}" type="datetimeFigureOut">
               <a:rPr lang="en-CA" smtClean="0"/>
-              <a:t>2023-03-10</a:t>
+              <a:t>2023-03-11</a:t>
             </a:fld>
             <a:endParaRPr lang="en-CA"/>
           </a:p>
@@ -1150,7 +1155,7 @@
           <a:p>
             <a:fld id="{BA759A12-2595-43BB-889B-763B23529FAF}" type="datetimeFigureOut">
               <a:rPr lang="en-CA" smtClean="0"/>
-              <a:t>2023-03-10</a:t>
+              <a:t>2023-03-11</a:t>
             </a:fld>
             <a:endParaRPr lang="en-CA"/>
           </a:p>
@@ -1418,7 +1423,7 @@
           <a:p>
             <a:fld id="{BA759A12-2595-43BB-889B-763B23529FAF}" type="datetimeFigureOut">
               <a:rPr lang="en-CA" smtClean="0"/>
-              <a:t>2023-03-10</a:t>
+              <a:t>2023-03-11</a:t>
             </a:fld>
             <a:endParaRPr lang="en-CA"/>
           </a:p>
@@ -1833,7 +1838,7 @@
           <a:p>
             <a:fld id="{BA759A12-2595-43BB-889B-763B23529FAF}" type="datetimeFigureOut">
               <a:rPr lang="en-CA" smtClean="0"/>
-              <a:t>2023-03-10</a:t>
+              <a:t>2023-03-11</a:t>
             </a:fld>
             <a:endParaRPr lang="en-CA"/>
           </a:p>
@@ -1975,7 +1980,7 @@
           <a:p>
             <a:fld id="{BA759A12-2595-43BB-889B-763B23529FAF}" type="datetimeFigureOut">
               <a:rPr lang="en-CA" smtClean="0"/>
-              <a:t>2023-03-10</a:t>
+              <a:t>2023-03-11</a:t>
             </a:fld>
             <a:endParaRPr lang="en-CA"/>
           </a:p>
@@ -2088,7 +2093,7 @@
           <a:p>
             <a:fld id="{BA759A12-2595-43BB-889B-763B23529FAF}" type="datetimeFigureOut">
               <a:rPr lang="en-CA" smtClean="0"/>
-              <a:t>2023-03-10</a:t>
+              <a:t>2023-03-11</a:t>
             </a:fld>
             <a:endParaRPr lang="en-CA"/>
           </a:p>
@@ -2401,7 +2406,7 @@
           <a:p>
             <a:fld id="{BA759A12-2595-43BB-889B-763B23529FAF}" type="datetimeFigureOut">
               <a:rPr lang="en-CA" smtClean="0"/>
-              <a:t>2023-03-10</a:t>
+              <a:t>2023-03-11</a:t>
             </a:fld>
             <a:endParaRPr lang="en-CA"/>
           </a:p>
@@ -2690,7 +2695,7 @@
           <a:p>
             <a:fld id="{BA759A12-2595-43BB-889B-763B23529FAF}" type="datetimeFigureOut">
               <a:rPr lang="en-CA" smtClean="0"/>
-              <a:t>2023-03-10</a:t>
+              <a:t>2023-03-11</a:t>
             </a:fld>
             <a:endParaRPr lang="en-CA"/>
           </a:p>
@@ -2936,7 +2941,7 @@
           <a:p>
             <a:fld id="{BA759A12-2595-43BB-889B-763B23529FAF}" type="datetimeFigureOut">
               <a:rPr lang="en-CA" smtClean="0"/>
-              <a:t>2023-03-10</a:t>
+              <a:t>2023-03-11</a:t>
             </a:fld>
             <a:endParaRPr lang="en-CA"/>
           </a:p>
@@ -4353,7 +4358,7 @@
         </p:nvSpPr>
         <p:spPr>
           <a:xfrm>
-            <a:off x="1852612" y="5172075"/>
+            <a:off x="1852612" y="5441016"/>
             <a:ext cx="8258175" cy="923330"/>
           </a:xfrm>
           <a:prstGeom prst="rect">
@@ -4376,6 +4381,181 @@
               <a:t>They can be used to make almost equally complex models with only 25% of the weights of the real version. This makes prediction whole lot more easier in low end devices.</a:t>
             </a:r>
             <a:endParaRPr lang="en-CA" dirty="0">
+              <a:solidFill>
+                <a:schemeClr val="bg1"/>
+              </a:solidFill>
+            </a:endParaRPr>
+          </a:p>
+        </p:txBody>
+      </p:sp>
+      <p:sp>
+        <p:nvSpPr>
+          <p:cNvPr id="2" name="TextBox 1">
+            <a:extLst>
+              <a:ext uri="{FF2B5EF4-FFF2-40B4-BE49-F238E27FC236}">
+                <a16:creationId xmlns:a16="http://schemas.microsoft.com/office/drawing/2014/main" id="{A1457268-0733-4E2F-943C-64C17C63BBB4}"/>
+              </a:ext>
+            </a:extLst>
+          </p:cNvPr>
+          <p:cNvSpPr txBox="1"/>
+          <p:nvPr/>
+        </p:nvSpPr>
+        <p:spPr>
+          <a:xfrm>
+            <a:off x="2218925" y="4778713"/>
+            <a:ext cx="8135147" cy="400110"/>
+          </a:xfrm>
+          <a:prstGeom prst="rect">
+            <a:avLst/>
+          </a:prstGeom>
+          <a:noFill/>
+        </p:spPr>
+        <p:txBody>
+          <a:bodyPr wrap="square" rtlCol="0">
+            <a:spAutoFit/>
+          </a:bodyPr>
+          <a:lstStyle/>
+          <a:p>
+            <a:pPr algn="ctr"/>
+            <a:r>
+              <a:rPr lang="en-US" sz="1000" dirty="0">
+                <a:solidFill>
+                  <a:schemeClr val="bg1"/>
+                </a:solidFill>
+              </a:rPr>
+              <a:t>This image has been taken from </a:t>
+            </a:r>
+            <a:r>
+              <a:rPr lang="en-US" sz="1000" dirty="0">
+                <a:solidFill>
+                  <a:schemeClr val="accent1"/>
+                </a:solidFill>
+                <a:hlinkClick r:id="rId3">
+                  <a:extLst>
+                    <a:ext uri="{A12FA001-AC4F-418D-AE19-62706E023703}">
+                      <ahyp:hlinkClr xmlns:ahyp="http://schemas.microsoft.com/office/drawing/2018/hyperlinkcolor" val="tx"/>
+                    </a:ext>
+                  </a:extLst>
+                </a:hlinkClick>
+              </a:rPr>
+              <a:t>this</a:t>
+            </a:r>
+            <a:r>
+              <a:rPr lang="en-US" sz="1000" dirty="0">
+                <a:solidFill>
+                  <a:schemeClr val="bg1"/>
+                </a:solidFill>
+              </a:rPr>
+              <a:t> paper.</a:t>
+            </a:r>
+          </a:p>
+          <a:p>
+            <a:pPr algn="ctr"/>
+            <a:r>
+              <a:rPr lang="en-CA" sz="1000" dirty="0" err="1">
+                <a:solidFill>
+                  <a:schemeClr val="bg1"/>
+                </a:solidFill>
+              </a:rPr>
+              <a:t>Titouan</a:t>
+            </a:r>
+            <a:r>
+              <a:rPr lang="en-CA" sz="1000" dirty="0">
+                <a:solidFill>
+                  <a:schemeClr val="bg1"/>
+                </a:solidFill>
+              </a:rPr>
+              <a:t> </a:t>
+            </a:r>
+            <a:r>
+              <a:rPr lang="en-CA" sz="1000" dirty="0" err="1">
+                <a:solidFill>
+                  <a:schemeClr val="bg1"/>
+                </a:solidFill>
+              </a:rPr>
+              <a:t>Parcollet</a:t>
+            </a:r>
+            <a:r>
+              <a:rPr lang="en-CA" sz="1000" dirty="0">
+                <a:solidFill>
+                  <a:schemeClr val="bg1"/>
+                </a:solidFill>
+              </a:rPr>
+              <a:t>, </a:t>
+            </a:r>
+            <a:r>
+              <a:rPr lang="en-CA" sz="1000" dirty="0" err="1">
+                <a:solidFill>
+                  <a:schemeClr val="bg1"/>
+                </a:solidFill>
+              </a:rPr>
+              <a:t>Mirco</a:t>
+            </a:r>
+            <a:r>
+              <a:rPr lang="en-CA" sz="1000" dirty="0">
+                <a:solidFill>
+                  <a:schemeClr val="bg1"/>
+                </a:solidFill>
+              </a:rPr>
+              <a:t> </a:t>
+            </a:r>
+            <a:r>
+              <a:rPr lang="en-CA" sz="1000" dirty="0" err="1">
+                <a:solidFill>
+                  <a:schemeClr val="bg1"/>
+                </a:solidFill>
+              </a:rPr>
+              <a:t>Ravanelli</a:t>
+            </a:r>
+            <a:r>
+              <a:rPr lang="en-CA" sz="1000" dirty="0">
+                <a:solidFill>
+                  <a:schemeClr val="bg1"/>
+                </a:solidFill>
+              </a:rPr>
+              <a:t>, Mohamed </a:t>
+            </a:r>
+            <a:r>
+              <a:rPr lang="en-CA" sz="1000" dirty="0" err="1">
+                <a:solidFill>
+                  <a:schemeClr val="bg1"/>
+                </a:solidFill>
+              </a:rPr>
+              <a:t>Morchid</a:t>
+            </a:r>
+            <a:r>
+              <a:rPr lang="en-CA" sz="1000" dirty="0">
+                <a:solidFill>
+                  <a:schemeClr val="bg1"/>
+                </a:solidFill>
+              </a:rPr>
+              <a:t>, Georges </a:t>
+            </a:r>
+            <a:r>
+              <a:rPr lang="en-CA" sz="1000" dirty="0" err="1">
+                <a:solidFill>
+                  <a:schemeClr val="bg1"/>
+                </a:solidFill>
+              </a:rPr>
+              <a:t>Linarès</a:t>
+            </a:r>
+            <a:r>
+              <a:rPr lang="en-CA" sz="1000" dirty="0">
+                <a:solidFill>
+                  <a:schemeClr val="bg1"/>
+                </a:solidFill>
+              </a:rPr>
+              <a:t>, and </a:t>
+            </a:r>
+            <a:r>
+              <a:rPr lang="en-US" sz="1000" dirty="0">
+                <a:solidFill>
+                  <a:schemeClr val="bg1"/>
+                </a:solidFill>
+              </a:rPr>
+              <a:t>Renato De Mori. 2018. Speech recognition with quaternion neural networks. </a:t>
+            </a:r>
+            <a:endParaRPr lang="en-CA" sz="1000" dirty="0">
               <a:solidFill>
                 <a:schemeClr val="bg1"/>
               </a:solidFill>

</xml_diff>